<commit_message>
add VScode github workshop uge8
</commit_message>
<xml_diff>
--- a/semester2 PPT/HTML_CSS_A11yV2  -  Repaired.pptx
+++ b/semester2 PPT/HTML_CSS_A11yV2  -  Repaired.pptx
@@ -5,79 +5,80 @@
     <p:sldMasterId id="2147483659" r:id="rId1"/>
   </p:sldMasterIdLst>
   <p:notesMasterIdLst>
-    <p:notesMasterId r:id="rId37"/>
+    <p:notesMasterId r:id="rId38"/>
   </p:notesMasterIdLst>
   <p:sldIdLst>
     <p:sldId id="256" r:id="rId2"/>
     <p:sldId id="257" r:id="rId3"/>
     <p:sldId id="332" r:id="rId4"/>
     <p:sldId id="307" r:id="rId5"/>
-    <p:sldId id="308" r:id="rId6"/>
-    <p:sldId id="309" r:id="rId7"/>
-    <p:sldId id="333" r:id="rId8"/>
-    <p:sldId id="310" r:id="rId9"/>
-    <p:sldId id="334" r:id="rId10"/>
-    <p:sldId id="355" r:id="rId11"/>
-    <p:sldId id="259" r:id="rId12"/>
-    <p:sldId id="262" r:id="rId13"/>
-    <p:sldId id="264" r:id="rId14"/>
-    <p:sldId id="265" r:id="rId15"/>
-    <p:sldId id="266" r:id="rId16"/>
-    <p:sldId id="356" r:id="rId17"/>
-    <p:sldId id="272" r:id="rId18"/>
-    <p:sldId id="275" r:id="rId19"/>
-    <p:sldId id="276" r:id="rId20"/>
-    <p:sldId id="278" r:id="rId21"/>
-    <p:sldId id="283" r:id="rId22"/>
-    <p:sldId id="284" r:id="rId23"/>
-    <p:sldId id="285" r:id="rId24"/>
-    <p:sldId id="288" r:id="rId25"/>
-    <p:sldId id="289" r:id="rId26"/>
-    <p:sldId id="290" r:id="rId27"/>
-    <p:sldId id="292" r:id="rId28"/>
-    <p:sldId id="294" r:id="rId29"/>
-    <p:sldId id="295" r:id="rId30"/>
-    <p:sldId id="296" r:id="rId31"/>
-    <p:sldId id="297" r:id="rId32"/>
-    <p:sldId id="298" r:id="rId33"/>
-    <p:sldId id="343" r:id="rId34"/>
-    <p:sldId id="357" r:id="rId35"/>
-    <p:sldId id="306" r:id="rId36"/>
+    <p:sldId id="358" r:id="rId6"/>
+    <p:sldId id="308" r:id="rId7"/>
+    <p:sldId id="309" r:id="rId8"/>
+    <p:sldId id="333" r:id="rId9"/>
+    <p:sldId id="310" r:id="rId10"/>
+    <p:sldId id="334" r:id="rId11"/>
+    <p:sldId id="355" r:id="rId12"/>
+    <p:sldId id="259" r:id="rId13"/>
+    <p:sldId id="262" r:id="rId14"/>
+    <p:sldId id="264" r:id="rId15"/>
+    <p:sldId id="265" r:id="rId16"/>
+    <p:sldId id="266" r:id="rId17"/>
+    <p:sldId id="356" r:id="rId18"/>
+    <p:sldId id="272" r:id="rId19"/>
+    <p:sldId id="275" r:id="rId20"/>
+    <p:sldId id="276" r:id="rId21"/>
+    <p:sldId id="278" r:id="rId22"/>
+    <p:sldId id="283" r:id="rId23"/>
+    <p:sldId id="284" r:id="rId24"/>
+    <p:sldId id="285" r:id="rId25"/>
+    <p:sldId id="288" r:id="rId26"/>
+    <p:sldId id="289" r:id="rId27"/>
+    <p:sldId id="290" r:id="rId28"/>
+    <p:sldId id="292" r:id="rId29"/>
+    <p:sldId id="294" r:id="rId30"/>
+    <p:sldId id="295" r:id="rId31"/>
+    <p:sldId id="296" r:id="rId32"/>
+    <p:sldId id="297" r:id="rId33"/>
+    <p:sldId id="298" r:id="rId34"/>
+    <p:sldId id="343" r:id="rId35"/>
+    <p:sldId id="357" r:id="rId36"/>
+    <p:sldId id="306" r:id="rId37"/>
   </p:sldIdLst>
   <p:sldSz cx="9144000" cy="5143500" type="screen16x9"/>
   <p:notesSz cx="6858000" cy="9144000"/>
   <p:embeddedFontLst>
     <p:embeddedFont>
       <p:font typeface="Inconsolata" pitchFamily="49" charset="77"/>
-      <p:regular r:id="rId38"/>
+      <p:regular r:id="rId39"/>
     </p:embeddedFont>
     <p:embeddedFont>
       <p:font typeface="Lato" panose="020F0502020204030203" pitchFamily="34" charset="0"/>
-      <p:regular r:id="rId39"/>
-      <p:bold r:id="rId40"/>
-      <p:italic r:id="rId41"/>
-      <p:boldItalic r:id="rId42"/>
+      <p:regular r:id="rId40"/>
+      <p:bold r:id="rId41"/>
+      <p:italic r:id="rId42"/>
+      <p:boldItalic r:id="rId43"/>
     </p:embeddedFont>
     <p:embeddedFont>
       <p:font typeface="Nunito" pitchFamily="2" charset="77"/>
-      <p:regular r:id="rId43"/>
-      <p:bold r:id="rId44"/>
-      <p:italic r:id="rId45"/>
-      <p:boldItalic r:id="rId46"/>
+      <p:regular r:id="rId44"/>
+      <p:bold r:id="rId45"/>
+      <p:italic r:id="rId46"/>
+      <p:boldItalic r:id="rId47"/>
     </p:embeddedFont>
     <p:embeddedFont>
       <p:font typeface="PT Sans" panose="020B0503020203020204" pitchFamily="34" charset="77"/>
-      <p:regular r:id="rId47"/>
-      <p:bold r:id="rId47"/>
-      <p:italic r:id="rId47"/>
-      <p:boldItalic r:id="rId47"/>
+      <p:regular r:id="rId48"/>
+      <p:bold r:id="rId48"/>
+      <p:italic r:id="rId48"/>
+      <p:boldItalic r:id="rId48"/>
     </p:embeddedFont>
     <p:embeddedFont>
       <p:font typeface="Raleway" pitchFamily="2" charset="77"/>
-      <p:regular r:id="rId48"/>
-      <p:bold r:id="rId49"/>
-      <p:italic r:id="rId50"/>
-      <p:boldItalic r:id="rId51"/>
+      <p:regular r:id="rId49"/>
+      <p:bold r:id="rId50"/>
+      <p:italic r:id="rId51"/>
+      <p:boldItalic r:id="rId52"/>
     </p:embeddedFont>
   </p:embeddedFontLst>
   <p:defaultTextStyle>
@@ -874,6 +875,110 @@
 </file>
 
 <file path=ppt/notesSlides/notesSlide10.xml><?xml version="1.0" encoding="utf-8"?>
+<p:notes xmlns:a="http://schemas.openxmlformats.org/drawingml/2006/main" xmlns:r="http://schemas.openxmlformats.org/officeDocument/2006/relationships" xmlns:p="http://schemas.openxmlformats.org/presentationml/2006/main" showMasterSp="0" showMasterPhAnim="0">
+  <p:cSld>
+    <p:spTree>
+      <p:nvGrpSpPr>
+        <p:cNvPr id="1" name="Shape 132"/>
+        <p:cNvGrpSpPr/>
+        <p:nvPr/>
+      </p:nvGrpSpPr>
+      <p:grpSpPr>
+        <a:xfrm>
+          <a:off x="0" y="0"/>
+          <a:ext cx="0" cy="0"/>
+          <a:chOff x="0" y="0"/>
+          <a:chExt cx="0" cy="0"/>
+        </a:xfrm>
+      </p:grpSpPr>
+      <p:sp>
+        <p:nvSpPr>
+          <p:cNvPr id="133" name="Google Shape;133;g307b47f37b7_0_0:notes"/>
+          <p:cNvSpPr>
+            <a:spLocks noGrp="1" noRot="1" noChangeAspect="1"/>
+          </p:cNvSpPr>
+          <p:nvPr>
+            <p:ph type="sldImg" idx="2"/>
+          </p:nvPr>
+        </p:nvSpPr>
+        <p:spPr>
+          <a:xfrm>
+            <a:off x="381000" y="685800"/>
+            <a:ext cx="6096000" cy="3429000"/>
+          </a:xfrm>
+          <a:custGeom>
+            <a:avLst/>
+            <a:gdLst/>
+            <a:ahLst/>
+            <a:cxnLst/>
+            <a:rect l="l" t="t" r="r" b="b"/>
+            <a:pathLst>
+              <a:path w="120000" h="120000" extrusionOk="0">
+                <a:moveTo>
+                  <a:pt x="0" y="0"/>
+                </a:moveTo>
+                <a:lnTo>
+                  <a:pt x="120000" y="0"/>
+                </a:lnTo>
+                <a:lnTo>
+                  <a:pt x="120000" y="120000"/>
+                </a:lnTo>
+                <a:lnTo>
+                  <a:pt x="0" y="120000"/>
+                </a:lnTo>
+                <a:close/>
+              </a:path>
+            </a:pathLst>
+          </a:custGeom>
+        </p:spPr>
+      </p:sp>
+      <p:sp>
+        <p:nvSpPr>
+          <p:cNvPr id="134" name="Google Shape;134;g307b47f37b7_0_0:notes"/>
+          <p:cNvSpPr txBox="1">
+            <a:spLocks noGrp="1"/>
+          </p:cNvSpPr>
+          <p:nvPr>
+            <p:ph type="body" idx="1"/>
+          </p:nvPr>
+        </p:nvSpPr>
+        <p:spPr>
+          <a:xfrm>
+            <a:off x="685800" y="4343400"/>
+            <a:ext cx="5486400" cy="4114800"/>
+          </a:xfrm>
+          <a:prstGeom prst="rect">
+            <a:avLst/>
+          </a:prstGeom>
+        </p:spPr>
+        <p:txBody>
+          <a:bodyPr spcFirstLastPara="1" wrap="square" lIns="91425" tIns="91425" rIns="91425" bIns="91425" anchor="t" anchorCtr="0">
+            <a:noAutofit/>
+          </a:bodyPr>
+          <a:lstStyle/>
+          <a:p>
+            <a:pPr marL="0" lvl="0" indent="0" algn="l" rtl="0">
+              <a:spcBef>
+                <a:spcPts val="0"/>
+              </a:spcBef>
+              <a:spcAft>
+                <a:spcPts val="0"/>
+              </a:spcAft>
+              <a:buNone/>
+            </a:pPr>
+            <a:endParaRPr/>
+          </a:p>
+        </p:txBody>
+      </p:sp>
+    </p:spTree>
+  </p:cSld>
+  <p:clrMapOvr>
+    <a:masterClrMapping/>
+  </p:clrMapOvr>
+</p:notes>
+</file>
+
+<file path=ppt/notesSlides/notesSlide11.xml><?xml version="1.0" encoding="utf-8"?>
 <p:notes xmlns:a="http://schemas.openxmlformats.org/drawingml/2006/main" xmlns:r="http://schemas.openxmlformats.org/officeDocument/2006/relationships" xmlns:p="http://schemas.openxmlformats.org/presentationml/2006/main">
   <p:cSld>
     <p:spTree>
@@ -971,7 +1076,7 @@
 </p:notes>
 </file>
 
-<file path=ppt/notesSlides/notesSlide11.xml><?xml version="1.0" encoding="utf-8"?>
+<file path=ppt/notesSlides/notesSlide12.xml><?xml version="1.0" encoding="utf-8"?>
 <p:notes xmlns:a="http://schemas.openxmlformats.org/drawingml/2006/main" xmlns:r="http://schemas.openxmlformats.org/officeDocument/2006/relationships" xmlns:p="http://schemas.openxmlformats.org/presentationml/2006/main" showMasterSp="0" showMasterPhAnim="0">
   <p:cSld>
     <p:spTree>
@@ -1075,7 +1180,7 @@
 </p:notes>
 </file>
 
-<file path=ppt/notesSlides/notesSlide12.xml><?xml version="1.0" encoding="utf-8"?>
+<file path=ppt/notesSlides/notesSlide13.xml><?xml version="1.0" encoding="utf-8"?>
 <p:notes xmlns:a="http://schemas.openxmlformats.org/drawingml/2006/main" xmlns:r="http://schemas.openxmlformats.org/officeDocument/2006/relationships" xmlns:p="http://schemas.openxmlformats.org/presentationml/2006/main" showMasterSp="0" showMasterPhAnim="0">
   <p:cSld>
     <p:spTree>
@@ -1179,7 +1284,7 @@
 </p:notes>
 </file>
 
-<file path=ppt/notesSlides/notesSlide13.xml><?xml version="1.0" encoding="utf-8"?>
+<file path=ppt/notesSlides/notesSlide14.xml><?xml version="1.0" encoding="utf-8"?>
 <p:notes xmlns:a="http://schemas.openxmlformats.org/drawingml/2006/main" xmlns:r="http://schemas.openxmlformats.org/officeDocument/2006/relationships" xmlns:p="http://schemas.openxmlformats.org/presentationml/2006/main" showMasterSp="0" showMasterPhAnim="0">
   <p:cSld>
     <p:spTree>
@@ -1283,7 +1388,7 @@
 </p:notes>
 </file>
 
-<file path=ppt/notesSlides/notesSlide14.xml><?xml version="1.0" encoding="utf-8"?>
+<file path=ppt/notesSlides/notesSlide15.xml><?xml version="1.0" encoding="utf-8"?>
 <p:notes xmlns:a="http://schemas.openxmlformats.org/drawingml/2006/main" xmlns:r="http://schemas.openxmlformats.org/officeDocument/2006/relationships" xmlns:p="http://schemas.openxmlformats.org/presentationml/2006/main" showMasterSp="0" showMasterPhAnim="0">
   <p:cSld>
     <p:spTree>
@@ -1387,7 +1492,7 @@
 </p:notes>
 </file>
 
-<file path=ppt/notesSlides/notesSlide15.xml><?xml version="1.0" encoding="utf-8"?>
+<file path=ppt/notesSlides/notesSlide16.xml><?xml version="1.0" encoding="utf-8"?>
 <p:notes xmlns:a="http://schemas.openxmlformats.org/drawingml/2006/main" xmlns:r="http://schemas.openxmlformats.org/officeDocument/2006/relationships" xmlns:p="http://schemas.openxmlformats.org/presentationml/2006/main" showMasterSp="0" showMasterPhAnim="0">
   <p:cSld>
     <p:spTree>
@@ -1491,7 +1596,7 @@
 </p:notes>
 </file>
 
-<file path=ppt/notesSlides/notesSlide16.xml><?xml version="1.0" encoding="utf-8"?>
+<file path=ppt/notesSlides/notesSlide17.xml><?xml version="1.0" encoding="utf-8"?>
 <p:notes xmlns:a="http://schemas.openxmlformats.org/drawingml/2006/main" xmlns:r="http://schemas.openxmlformats.org/officeDocument/2006/relationships" xmlns:p="http://schemas.openxmlformats.org/presentationml/2006/main" showMasterSp="0" showMasterPhAnim="0">
   <p:cSld>
     <p:spTree>
@@ -1595,7 +1700,7 @@
 </p:notes>
 </file>
 
-<file path=ppt/notesSlides/notesSlide17.xml><?xml version="1.0" encoding="utf-8"?>
+<file path=ppt/notesSlides/notesSlide18.xml><?xml version="1.0" encoding="utf-8"?>
 <p:notes xmlns:a="http://schemas.openxmlformats.org/drawingml/2006/main" xmlns:r="http://schemas.openxmlformats.org/officeDocument/2006/relationships" xmlns:p="http://schemas.openxmlformats.org/presentationml/2006/main" showMasterSp="0" showMasterPhAnim="0">
   <p:cSld>
     <p:spTree>
@@ -1699,7 +1804,7 @@
 </p:notes>
 </file>
 
-<file path=ppt/notesSlides/notesSlide18.xml><?xml version="1.0" encoding="utf-8"?>
+<file path=ppt/notesSlides/notesSlide19.xml><?xml version="1.0" encoding="utf-8"?>
 <p:notes xmlns:a="http://schemas.openxmlformats.org/drawingml/2006/main" xmlns:r="http://schemas.openxmlformats.org/officeDocument/2006/relationships" xmlns:p="http://schemas.openxmlformats.org/presentationml/2006/main" showMasterSp="0" showMasterPhAnim="0">
   <p:cSld>
     <p:spTree>
@@ -1760,110 +1865,6 @@
       <p:sp>
         <p:nvSpPr>
           <p:cNvPr id="291" name="Google Shape;291;g2eeddfeaf16_0_7:notes"/>
-          <p:cNvSpPr txBox="1">
-            <a:spLocks noGrp="1"/>
-          </p:cNvSpPr>
-          <p:nvPr>
-            <p:ph type="body" idx="1"/>
-          </p:nvPr>
-        </p:nvSpPr>
-        <p:spPr>
-          <a:xfrm>
-            <a:off x="685800" y="4343400"/>
-            <a:ext cx="5486400" cy="4114800"/>
-          </a:xfrm>
-          <a:prstGeom prst="rect">
-            <a:avLst/>
-          </a:prstGeom>
-        </p:spPr>
-        <p:txBody>
-          <a:bodyPr spcFirstLastPara="1" wrap="square" lIns="91425" tIns="91425" rIns="91425" bIns="91425" anchor="t" anchorCtr="0">
-            <a:noAutofit/>
-          </a:bodyPr>
-          <a:lstStyle/>
-          <a:p>
-            <a:pPr marL="0" lvl="0" indent="0" algn="l" rtl="0">
-              <a:spcBef>
-                <a:spcPts val="0"/>
-              </a:spcBef>
-              <a:spcAft>
-                <a:spcPts val="0"/>
-              </a:spcAft>
-              <a:buNone/>
-            </a:pPr>
-            <a:endParaRPr/>
-          </a:p>
-        </p:txBody>
-      </p:sp>
-    </p:spTree>
-  </p:cSld>
-  <p:clrMapOvr>
-    <a:masterClrMapping/>
-  </p:clrMapOvr>
-</p:notes>
-</file>
-
-<file path=ppt/notesSlides/notesSlide19.xml><?xml version="1.0" encoding="utf-8"?>
-<p:notes xmlns:a="http://schemas.openxmlformats.org/drawingml/2006/main" xmlns:r="http://schemas.openxmlformats.org/officeDocument/2006/relationships" xmlns:p="http://schemas.openxmlformats.org/presentationml/2006/main" showMasterSp="0" showMasterPhAnim="0">
-  <p:cSld>
-    <p:spTree>
-      <p:nvGrpSpPr>
-        <p:cNvPr id="1" name="Shape 298"/>
-        <p:cNvGrpSpPr/>
-        <p:nvPr/>
-      </p:nvGrpSpPr>
-      <p:grpSpPr>
-        <a:xfrm>
-          <a:off x="0" y="0"/>
-          <a:ext cx="0" cy="0"/>
-          <a:chOff x="0" y="0"/>
-          <a:chExt cx="0" cy="0"/>
-        </a:xfrm>
-      </p:grpSpPr>
-      <p:sp>
-        <p:nvSpPr>
-          <p:cNvPr id="299" name="Google Shape;299;g2eeddfeaf16_0_26:notes"/>
-          <p:cNvSpPr>
-            <a:spLocks noGrp="1" noRot="1" noChangeAspect="1"/>
-          </p:cNvSpPr>
-          <p:nvPr>
-            <p:ph type="sldImg" idx="2"/>
-          </p:nvPr>
-        </p:nvSpPr>
-        <p:spPr>
-          <a:xfrm>
-            <a:off x="381000" y="685800"/>
-            <a:ext cx="6096000" cy="3429000"/>
-          </a:xfrm>
-          <a:custGeom>
-            <a:avLst/>
-            <a:gdLst/>
-            <a:ahLst/>
-            <a:cxnLst/>
-            <a:rect l="l" t="t" r="r" b="b"/>
-            <a:pathLst>
-              <a:path w="120000" h="120000" extrusionOk="0">
-                <a:moveTo>
-                  <a:pt x="0" y="0"/>
-                </a:moveTo>
-                <a:lnTo>
-                  <a:pt x="120000" y="0"/>
-                </a:lnTo>
-                <a:lnTo>
-                  <a:pt x="120000" y="120000"/>
-                </a:lnTo>
-                <a:lnTo>
-                  <a:pt x="0" y="120000"/>
-                </a:lnTo>
-                <a:close/>
-              </a:path>
-            </a:pathLst>
-          </a:custGeom>
-        </p:spPr>
-      </p:sp>
-      <p:sp>
-        <p:nvSpPr>
-          <p:cNvPr id="300" name="Google Shape;300;g2eeddfeaf16_0_26:notes"/>
           <p:cNvSpPr txBox="1">
             <a:spLocks noGrp="1"/>
           </p:cNvSpPr>
@@ -2016,6 +2017,110 @@
   <p:cSld>
     <p:spTree>
       <p:nvGrpSpPr>
+        <p:cNvPr id="1" name="Shape 298"/>
+        <p:cNvGrpSpPr/>
+        <p:nvPr/>
+      </p:nvGrpSpPr>
+      <p:grpSpPr>
+        <a:xfrm>
+          <a:off x="0" y="0"/>
+          <a:ext cx="0" cy="0"/>
+          <a:chOff x="0" y="0"/>
+          <a:chExt cx="0" cy="0"/>
+        </a:xfrm>
+      </p:grpSpPr>
+      <p:sp>
+        <p:nvSpPr>
+          <p:cNvPr id="299" name="Google Shape;299;g2eeddfeaf16_0_26:notes"/>
+          <p:cNvSpPr>
+            <a:spLocks noGrp="1" noRot="1" noChangeAspect="1"/>
+          </p:cNvSpPr>
+          <p:nvPr>
+            <p:ph type="sldImg" idx="2"/>
+          </p:nvPr>
+        </p:nvSpPr>
+        <p:spPr>
+          <a:xfrm>
+            <a:off x="381000" y="685800"/>
+            <a:ext cx="6096000" cy="3429000"/>
+          </a:xfrm>
+          <a:custGeom>
+            <a:avLst/>
+            <a:gdLst/>
+            <a:ahLst/>
+            <a:cxnLst/>
+            <a:rect l="l" t="t" r="r" b="b"/>
+            <a:pathLst>
+              <a:path w="120000" h="120000" extrusionOk="0">
+                <a:moveTo>
+                  <a:pt x="0" y="0"/>
+                </a:moveTo>
+                <a:lnTo>
+                  <a:pt x="120000" y="0"/>
+                </a:lnTo>
+                <a:lnTo>
+                  <a:pt x="120000" y="120000"/>
+                </a:lnTo>
+                <a:lnTo>
+                  <a:pt x="0" y="120000"/>
+                </a:lnTo>
+                <a:close/>
+              </a:path>
+            </a:pathLst>
+          </a:custGeom>
+        </p:spPr>
+      </p:sp>
+      <p:sp>
+        <p:nvSpPr>
+          <p:cNvPr id="300" name="Google Shape;300;g2eeddfeaf16_0_26:notes"/>
+          <p:cNvSpPr txBox="1">
+            <a:spLocks noGrp="1"/>
+          </p:cNvSpPr>
+          <p:nvPr>
+            <p:ph type="body" idx="1"/>
+          </p:nvPr>
+        </p:nvSpPr>
+        <p:spPr>
+          <a:xfrm>
+            <a:off x="685800" y="4343400"/>
+            <a:ext cx="5486400" cy="4114800"/>
+          </a:xfrm>
+          <a:prstGeom prst="rect">
+            <a:avLst/>
+          </a:prstGeom>
+        </p:spPr>
+        <p:txBody>
+          <a:bodyPr spcFirstLastPara="1" wrap="square" lIns="91425" tIns="91425" rIns="91425" bIns="91425" anchor="t" anchorCtr="0">
+            <a:noAutofit/>
+          </a:bodyPr>
+          <a:lstStyle/>
+          <a:p>
+            <a:pPr marL="0" lvl="0" indent="0" algn="l" rtl="0">
+              <a:spcBef>
+                <a:spcPts val="0"/>
+              </a:spcBef>
+              <a:spcAft>
+                <a:spcPts val="0"/>
+              </a:spcAft>
+              <a:buNone/>
+            </a:pPr>
+            <a:endParaRPr/>
+          </a:p>
+        </p:txBody>
+      </p:sp>
+    </p:spTree>
+  </p:cSld>
+  <p:clrMapOvr>
+    <a:masterClrMapping/>
+  </p:clrMapOvr>
+</p:notes>
+</file>
+
+<file path=ppt/notesSlides/notesSlide21.xml><?xml version="1.0" encoding="utf-8"?>
+<p:notes xmlns:a="http://schemas.openxmlformats.org/drawingml/2006/main" xmlns:r="http://schemas.openxmlformats.org/officeDocument/2006/relationships" xmlns:p="http://schemas.openxmlformats.org/presentationml/2006/main" showMasterSp="0" showMasterPhAnim="0">
+  <p:cSld>
+    <p:spTree>
+      <p:nvGrpSpPr>
         <p:cNvPr id="1" name="Shape 305"/>
         <p:cNvGrpSpPr/>
         <p:nvPr/>
@@ -2115,7 +2220,7 @@
 </p:notes>
 </file>
 
-<file path=ppt/notesSlides/notesSlide21.xml><?xml version="1.0" encoding="utf-8"?>
+<file path=ppt/notesSlides/notesSlide22.xml><?xml version="1.0" encoding="utf-8"?>
 <p:notes xmlns:a="http://schemas.openxmlformats.org/drawingml/2006/main" xmlns:r="http://schemas.openxmlformats.org/officeDocument/2006/relationships" xmlns:p="http://schemas.openxmlformats.org/presentationml/2006/main" showMasterSp="0" showMasterPhAnim="0">
   <p:cSld>
     <p:spTree>
@@ -2219,7 +2324,7 @@
 </p:notes>
 </file>
 
-<file path=ppt/notesSlides/notesSlide22.xml><?xml version="1.0" encoding="utf-8"?>
+<file path=ppt/notesSlides/notesSlide23.xml><?xml version="1.0" encoding="utf-8"?>
 <p:notes xmlns:a="http://schemas.openxmlformats.org/drawingml/2006/main" xmlns:r="http://schemas.openxmlformats.org/officeDocument/2006/relationships" xmlns:p="http://schemas.openxmlformats.org/presentationml/2006/main" showMasterSp="0" showMasterPhAnim="0">
   <p:cSld>
     <p:spTree>
@@ -2323,7 +2428,7 @@
 </p:notes>
 </file>
 
-<file path=ppt/notesSlides/notesSlide23.xml><?xml version="1.0" encoding="utf-8"?>
+<file path=ppt/notesSlides/notesSlide24.xml><?xml version="1.0" encoding="utf-8"?>
 <p:notes xmlns:a="http://schemas.openxmlformats.org/drawingml/2006/main" xmlns:r="http://schemas.openxmlformats.org/officeDocument/2006/relationships" xmlns:p="http://schemas.openxmlformats.org/presentationml/2006/main" showMasterSp="0" showMasterPhAnim="0">
   <p:cSld>
     <p:spTree>
@@ -2427,7 +2532,7 @@
 </p:notes>
 </file>
 
-<file path=ppt/notesSlides/notesSlide24.xml><?xml version="1.0" encoding="utf-8"?>
+<file path=ppt/notesSlides/notesSlide25.xml><?xml version="1.0" encoding="utf-8"?>
 <p:notes xmlns:a="http://schemas.openxmlformats.org/drawingml/2006/main" xmlns:r="http://schemas.openxmlformats.org/officeDocument/2006/relationships" xmlns:p="http://schemas.openxmlformats.org/presentationml/2006/main" showMasterSp="0" showMasterPhAnim="0">
   <p:cSld>
     <p:spTree>
@@ -2531,7 +2636,7 @@
 </p:notes>
 </file>
 
-<file path=ppt/notesSlides/notesSlide25.xml><?xml version="1.0" encoding="utf-8"?>
+<file path=ppt/notesSlides/notesSlide26.xml><?xml version="1.0" encoding="utf-8"?>
 <p:notes xmlns:a="http://schemas.openxmlformats.org/drawingml/2006/main" xmlns:r="http://schemas.openxmlformats.org/officeDocument/2006/relationships" xmlns:p="http://schemas.openxmlformats.org/presentationml/2006/main" showMasterSp="0" showMasterPhAnim="0">
   <p:cSld>
     <p:spTree>
@@ -2635,7 +2740,7 @@
 </p:notes>
 </file>
 
-<file path=ppt/notesSlides/notesSlide26.xml><?xml version="1.0" encoding="utf-8"?>
+<file path=ppt/notesSlides/notesSlide27.xml><?xml version="1.0" encoding="utf-8"?>
 <p:notes xmlns:a="http://schemas.openxmlformats.org/drawingml/2006/main" xmlns:r="http://schemas.openxmlformats.org/officeDocument/2006/relationships" xmlns:p="http://schemas.openxmlformats.org/presentationml/2006/main" showMasterSp="0" showMasterPhAnim="0">
   <p:cSld>
     <p:spTree>
@@ -2739,7 +2844,7 @@
 </p:notes>
 </file>
 
-<file path=ppt/notesSlides/notesSlide27.xml><?xml version="1.0" encoding="utf-8"?>
+<file path=ppt/notesSlides/notesSlide28.xml><?xml version="1.0" encoding="utf-8"?>
 <p:notes xmlns:a="http://schemas.openxmlformats.org/drawingml/2006/main" xmlns:r="http://schemas.openxmlformats.org/officeDocument/2006/relationships" xmlns:p="http://schemas.openxmlformats.org/presentationml/2006/main">
   <p:cSld>
     <p:spTree>
@@ -2821,7 +2926,7 @@
           <a:p>
             <a:fld id="{DD38BA25-E899-7D4E-9A80-21091E4628C2}" type="slidenum">
               <a:rPr lang="en-DK" smtClean="0"/>
-              <a:t>34</a:t>
+              <a:t>35</a:t>
             </a:fld>
             <a:endParaRPr lang="en-DK"/>
           </a:p>
@@ -2840,7 +2945,7 @@
 </p:notes>
 </file>
 
-<file path=ppt/notesSlides/notesSlide28.xml><?xml version="1.0" encoding="utf-8"?>
+<file path=ppt/notesSlides/notesSlide29.xml><?xml version="1.0" encoding="utf-8"?>
 <p:notes xmlns:a="http://schemas.openxmlformats.org/drawingml/2006/main" xmlns:r="http://schemas.openxmlformats.org/officeDocument/2006/relationships" xmlns:p="http://schemas.openxmlformats.org/presentationml/2006/main" showMasterSp="0" showMasterPhAnim="0">
   <p:cSld>
     <p:spTree>
@@ -2995,19 +3100,18 @@
           <a:p>
             <a:r>
               <a:rPr lang="en-GB" dirty="0"/>
-              <a:t>A</a:t>
-            </a:r>
-            <a:r>
-              <a:rPr lang="en-DK" dirty="0"/>
-              <a:t>pple assistive technologie- Mac voiceover</a:t>
-            </a:r>
+              <a:t> </a:t>
+            </a:r>
+          </a:p>
+          <a:p>
+            <a:endParaRPr lang="en-DK" dirty="0"/>
           </a:p>
         </p:txBody>
       </p:sp>
     </p:spTree>
     <p:extLst>
       <p:ext uri="{BB962C8B-B14F-4D97-AF65-F5344CB8AC3E}">
-        <p14:creationId xmlns:p14="http://schemas.microsoft.com/office/powerpoint/2010/main" val="957998852"/>
+        <p14:creationId xmlns:p14="http://schemas.microsoft.com/office/powerpoint/2010/main" val="3351280762"/>
       </p:ext>
     </p:extLst>
   </p:cSld>
@@ -3046,6 +3150,79 @@
         </p:nvSpPr>
         <p:spPr>
           <a:xfrm>
+            <a:off x="381000" y="685800"/>
+            <a:ext cx="6096000" cy="3429000"/>
+          </a:xfrm>
+        </p:spPr>
+      </p:sp>
+      <p:sp>
+        <p:nvSpPr>
+          <p:cNvPr id="3" name="Notes Placeholder 2"/>
+          <p:cNvSpPr>
+            <a:spLocks noGrp="1"/>
+          </p:cNvSpPr>
+          <p:nvPr>
+            <p:ph type="body" idx="1"/>
+          </p:nvPr>
+        </p:nvSpPr>
+        <p:spPr/>
+        <p:txBody>
+          <a:bodyPr/>
+          <a:lstStyle/>
+          <a:p>
+            <a:r>
+              <a:rPr lang="en-GB" dirty="0"/>
+              <a:t>A</a:t>
+            </a:r>
+            <a:r>
+              <a:rPr lang="en-DK" dirty="0"/>
+              <a:t>pple assistive technologie- Mac voiceover</a:t>
+            </a:r>
+          </a:p>
+        </p:txBody>
+      </p:sp>
+    </p:spTree>
+    <p:extLst>
+      <p:ext uri="{BB962C8B-B14F-4D97-AF65-F5344CB8AC3E}">
+        <p14:creationId xmlns:p14="http://schemas.microsoft.com/office/powerpoint/2010/main" val="957998852"/>
+      </p:ext>
+    </p:extLst>
+  </p:cSld>
+  <p:clrMapOvr>
+    <a:masterClrMapping/>
+  </p:clrMapOvr>
+</p:notes>
+</file>
+
+<file path=ppt/notesSlides/notesSlide5.xml><?xml version="1.0" encoding="utf-8"?>
+<p:notes xmlns:a="http://schemas.openxmlformats.org/drawingml/2006/main" xmlns:r="http://schemas.openxmlformats.org/officeDocument/2006/relationships" xmlns:p="http://schemas.openxmlformats.org/presentationml/2006/main">
+  <p:cSld>
+    <p:spTree>
+      <p:nvGrpSpPr>
+        <p:cNvPr id="1" name=""/>
+        <p:cNvGrpSpPr/>
+        <p:nvPr/>
+      </p:nvGrpSpPr>
+      <p:grpSpPr>
+        <a:xfrm>
+          <a:off x="0" y="0"/>
+          <a:ext cx="0" cy="0"/>
+          <a:chOff x="0" y="0"/>
+          <a:chExt cx="0" cy="0"/>
+        </a:xfrm>
+      </p:grpSpPr>
+      <p:sp>
+        <p:nvSpPr>
+          <p:cNvPr id="2" name="Slide Image Placeholder 1"/>
+          <p:cNvSpPr>
+            <a:spLocks noGrp="1" noRot="1" noChangeAspect="1"/>
+          </p:cNvSpPr>
+          <p:nvPr>
+            <p:ph type="sldImg"/>
+          </p:nvPr>
+        </p:nvSpPr>
+        <p:spPr>
+          <a:xfrm>
             <a:off x="-273050" y="1828800"/>
             <a:ext cx="8775700" cy="4937125"/>
           </a:xfrm>
@@ -3108,7 +3285,7 @@
 </p:notes>
 </file>
 
-<file path=ppt/notesSlides/notesSlide5.xml><?xml version="1.0" encoding="utf-8"?>
+<file path=ppt/notesSlides/notesSlide6.xml><?xml version="1.0" encoding="utf-8"?>
 <p:notes xmlns:a="http://schemas.openxmlformats.org/drawingml/2006/main" xmlns:r="http://schemas.openxmlformats.org/officeDocument/2006/relationships" xmlns:p="http://schemas.openxmlformats.org/presentationml/2006/main" showMasterSp="0" showMasterPhAnim="0">
   <p:cSld>
     <p:spTree>
@@ -3212,7 +3389,7 @@
 </p:notes>
 </file>
 
-<file path=ppt/notesSlides/notesSlide6.xml><?xml version="1.0" encoding="utf-8"?>
+<file path=ppt/notesSlides/notesSlide7.xml><?xml version="1.0" encoding="utf-8"?>
 <p:notes xmlns:a="http://schemas.openxmlformats.org/drawingml/2006/main" xmlns:r="http://schemas.openxmlformats.org/officeDocument/2006/relationships" xmlns:p="http://schemas.openxmlformats.org/presentationml/2006/main" showMasterSp="0" showMasterPhAnim="0">
   <p:cSld>
     <p:spTree>
@@ -3316,7 +3493,7 @@
 </p:notes>
 </file>
 
-<file path=ppt/notesSlides/notesSlide7.xml><?xml version="1.0" encoding="utf-8"?>
+<file path=ppt/notesSlides/notesSlide8.xml><?xml version="1.0" encoding="utf-8"?>
 <p:notes xmlns:a="http://schemas.openxmlformats.org/drawingml/2006/main" xmlns:r="http://schemas.openxmlformats.org/officeDocument/2006/relationships" xmlns:p="http://schemas.openxmlformats.org/presentationml/2006/main" showMasterSp="0" showMasterPhAnim="0">
   <p:cSld>
     <p:spTree>
@@ -3420,7 +3597,7 @@
 </p:notes>
 </file>
 
-<file path=ppt/notesSlides/notesSlide8.xml><?xml version="1.0" encoding="utf-8"?>
+<file path=ppt/notesSlides/notesSlide9.xml><?xml version="1.0" encoding="utf-8"?>
 <p:notes xmlns:a="http://schemas.openxmlformats.org/drawingml/2006/main" xmlns:r="http://schemas.openxmlformats.org/officeDocument/2006/relationships" xmlns:p="http://schemas.openxmlformats.org/presentationml/2006/main" showMasterSp="0" showMasterPhAnim="0">
   <p:cSld>
     <p:spTree>
@@ -3481,110 +3658,6 @@
       <p:sp>
         <p:nvSpPr>
           <p:cNvPr id="127" name="Google Shape;127;g2f03217a4c4_1_6:notes"/>
-          <p:cNvSpPr txBox="1">
-            <a:spLocks noGrp="1"/>
-          </p:cNvSpPr>
-          <p:nvPr>
-            <p:ph type="body" idx="1"/>
-          </p:nvPr>
-        </p:nvSpPr>
-        <p:spPr>
-          <a:xfrm>
-            <a:off x="685800" y="4343400"/>
-            <a:ext cx="5486400" cy="4114800"/>
-          </a:xfrm>
-          <a:prstGeom prst="rect">
-            <a:avLst/>
-          </a:prstGeom>
-        </p:spPr>
-        <p:txBody>
-          <a:bodyPr spcFirstLastPara="1" wrap="square" lIns="91425" tIns="91425" rIns="91425" bIns="91425" anchor="t" anchorCtr="0">
-            <a:noAutofit/>
-          </a:bodyPr>
-          <a:lstStyle/>
-          <a:p>
-            <a:pPr marL="0" lvl="0" indent="0" algn="l" rtl="0">
-              <a:spcBef>
-                <a:spcPts val="0"/>
-              </a:spcBef>
-              <a:spcAft>
-                <a:spcPts val="0"/>
-              </a:spcAft>
-              <a:buNone/>
-            </a:pPr>
-            <a:endParaRPr/>
-          </a:p>
-        </p:txBody>
-      </p:sp>
-    </p:spTree>
-  </p:cSld>
-  <p:clrMapOvr>
-    <a:masterClrMapping/>
-  </p:clrMapOvr>
-</p:notes>
-</file>
-
-<file path=ppt/notesSlides/notesSlide9.xml><?xml version="1.0" encoding="utf-8"?>
-<p:notes xmlns:a="http://schemas.openxmlformats.org/drawingml/2006/main" xmlns:r="http://schemas.openxmlformats.org/officeDocument/2006/relationships" xmlns:p="http://schemas.openxmlformats.org/presentationml/2006/main" showMasterSp="0" showMasterPhAnim="0">
-  <p:cSld>
-    <p:spTree>
-      <p:nvGrpSpPr>
-        <p:cNvPr id="1" name="Shape 132"/>
-        <p:cNvGrpSpPr/>
-        <p:nvPr/>
-      </p:nvGrpSpPr>
-      <p:grpSpPr>
-        <a:xfrm>
-          <a:off x="0" y="0"/>
-          <a:ext cx="0" cy="0"/>
-          <a:chOff x="0" y="0"/>
-          <a:chExt cx="0" cy="0"/>
-        </a:xfrm>
-      </p:grpSpPr>
-      <p:sp>
-        <p:nvSpPr>
-          <p:cNvPr id="133" name="Google Shape;133;g307b47f37b7_0_0:notes"/>
-          <p:cNvSpPr>
-            <a:spLocks noGrp="1" noRot="1" noChangeAspect="1"/>
-          </p:cNvSpPr>
-          <p:nvPr>
-            <p:ph type="sldImg" idx="2"/>
-          </p:nvPr>
-        </p:nvSpPr>
-        <p:spPr>
-          <a:xfrm>
-            <a:off x="381000" y="685800"/>
-            <a:ext cx="6096000" cy="3429000"/>
-          </a:xfrm>
-          <a:custGeom>
-            <a:avLst/>
-            <a:gdLst/>
-            <a:ahLst/>
-            <a:cxnLst/>
-            <a:rect l="l" t="t" r="r" b="b"/>
-            <a:pathLst>
-              <a:path w="120000" h="120000" extrusionOk="0">
-                <a:moveTo>
-                  <a:pt x="0" y="0"/>
-                </a:moveTo>
-                <a:lnTo>
-                  <a:pt x="120000" y="0"/>
-                </a:lnTo>
-                <a:lnTo>
-                  <a:pt x="120000" y="120000"/>
-                </a:lnTo>
-                <a:lnTo>
-                  <a:pt x="0" y="120000"/>
-                </a:lnTo>
-                <a:close/>
-              </a:path>
-            </a:pathLst>
-          </a:custGeom>
-        </p:spPr>
-      </p:sp>
-      <p:sp>
-        <p:nvSpPr>
-          <p:cNvPr id="134" name="Google Shape;134;g307b47f37b7_0_0:notes"/>
           <p:cNvSpPr txBox="1">
             <a:spLocks noGrp="1"/>
           </p:cNvSpPr>
@@ -5000,7 +5073,7 @@
           <a:p>
             <a:fld id="{5BCAD085-E8A6-8845-BD4E-CB4CCA059FC4}" type="datetimeFigureOut">
               <a:rPr lang="en-US" smtClean="0"/>
-              <a:t>1/27/25</a:t>
+              <a:t>1/29/25</a:t>
             </a:fld>
             <a:endParaRPr lang="en-US"/>
           </a:p>
@@ -10077,7 +10150,7 @@
                 <a:cs typeface="PT Sans"/>
                 <a:sym typeface="PT Sans"/>
               </a:rPr>
-              <a:t>HTML &amp; CSS Tiny Tips:  making websites accessible</a:t>
+              <a:t>HTML &amp; CSS  *A11y Tips:  making websites accessible</a:t>
             </a:r>
             <a:endParaRPr dirty="0">
               <a:latin typeface="PT Sans"/>
@@ -10165,7 +10238,7 @@
                 <a:cs typeface="Nunito"/>
                 <a:sym typeface="Nunito"/>
               </a:rPr>
-              <a:t>, 2025</a:t>
+              <a:t>, 2025  v 1.3</a:t>
             </a:r>
             <a:endParaRPr dirty="0">
               <a:latin typeface="Nunito"/>
@@ -10203,6 +10276,123 @@
       </p:grpSpPr>
       <p:sp>
         <p:nvSpPr>
+          <p:cNvPr id="2" name="Title 1">
+            <a:extLst>
+              <a:ext uri="{FF2B5EF4-FFF2-40B4-BE49-F238E27FC236}">
+                <a16:creationId xmlns:a16="http://schemas.microsoft.com/office/drawing/2014/main" id="{9BDF57E0-B6EE-7971-0691-B763C73E444A}"/>
+              </a:ext>
+            </a:extLst>
+          </p:cNvPr>
+          <p:cNvSpPr>
+            <a:spLocks noGrp="1"/>
+          </p:cNvSpPr>
+          <p:nvPr>
+            <p:ph type="title"/>
+          </p:nvPr>
+        </p:nvSpPr>
+        <p:spPr/>
+        <p:txBody>
+          <a:bodyPr/>
+          <a:lstStyle/>
+          <a:p>
+            <a:r>
+              <a:rPr lang="en-DK" dirty="0"/>
+              <a:t>ARIA -Attribute</a:t>
+            </a:r>
+          </a:p>
+        </p:txBody>
+      </p:sp>
+      <p:pic>
+        <p:nvPicPr>
+          <p:cNvPr id="5" name="Content Placeholder 4" descr="A screen shot of a computer code&#10;&#10;AI-generated content may be incorrect.">
+            <a:extLst>
+              <a:ext uri="{FF2B5EF4-FFF2-40B4-BE49-F238E27FC236}">
+                <a16:creationId xmlns:a16="http://schemas.microsoft.com/office/drawing/2014/main" id="{DFCCBD1F-6152-4835-38D1-5BA280912D95}"/>
+              </a:ext>
+            </a:extLst>
+          </p:cNvPr>
+          <p:cNvPicPr>
+            <a:picLocks noGrp="1" noChangeAspect="1"/>
+          </p:cNvPicPr>
+          <p:nvPr>
+            <p:ph idx="1"/>
+          </p:nvPr>
+        </p:nvPicPr>
+        <p:blipFill>
+          <a:blip r:embed="rId2"/>
+          <a:stretch>
+            <a:fillRect/>
+          </a:stretch>
+        </p:blipFill>
+        <p:spPr>
+          <a:xfrm>
+            <a:off x="411960" y="1980825"/>
+            <a:ext cx="2697581" cy="1097441"/>
+          </a:xfrm>
+        </p:spPr>
+      </p:pic>
+      <p:pic>
+        <p:nvPicPr>
+          <p:cNvPr id="7" name="Picture 6" descr="A screenshot of a computer&#10;&#10;AI-generated content may be incorrect.">
+            <a:extLst>
+              <a:ext uri="{FF2B5EF4-FFF2-40B4-BE49-F238E27FC236}">
+                <a16:creationId xmlns:a16="http://schemas.microsoft.com/office/drawing/2014/main" id="{A0D30F77-7198-9E9E-2D4B-D5B77894D96F}"/>
+              </a:ext>
+            </a:extLst>
+          </p:cNvPr>
+          <p:cNvPicPr>
+            <a:picLocks noChangeAspect="1"/>
+          </p:cNvPicPr>
+          <p:nvPr/>
+        </p:nvPicPr>
+        <p:blipFill>
+          <a:blip r:embed="rId3"/>
+          <a:stretch>
+            <a:fillRect/>
+          </a:stretch>
+        </p:blipFill>
+        <p:spPr>
+          <a:xfrm>
+            <a:off x="3439699" y="1480672"/>
+            <a:ext cx="5613990" cy="2881117"/>
+          </a:xfrm>
+          <a:prstGeom prst="rect">
+            <a:avLst/>
+          </a:prstGeom>
+        </p:spPr>
+      </p:pic>
+    </p:spTree>
+    <p:extLst>
+      <p:ext uri="{BB962C8B-B14F-4D97-AF65-F5344CB8AC3E}">
+        <p14:creationId xmlns:p14="http://schemas.microsoft.com/office/powerpoint/2010/main" val="2819886570"/>
+      </p:ext>
+    </p:extLst>
+  </p:cSld>
+  <p:clrMapOvr>
+    <a:masterClrMapping/>
+  </p:clrMapOvr>
+</p:sld>
+</file>
+
+<file path=ppt/slides/slide11.xml><?xml version="1.0" encoding="utf-8"?>
+<p:sld xmlns:a="http://schemas.openxmlformats.org/drawingml/2006/main" xmlns:r="http://schemas.openxmlformats.org/officeDocument/2006/relationships" xmlns:p="http://schemas.openxmlformats.org/presentationml/2006/main">
+  <p:cSld>
+    <p:spTree>
+      <p:nvGrpSpPr>
+        <p:cNvPr id="1" name=""/>
+        <p:cNvGrpSpPr/>
+        <p:nvPr/>
+      </p:nvGrpSpPr>
+      <p:grpSpPr>
+        <a:xfrm>
+          <a:off x="0" y="0"/>
+          <a:ext cx="0" cy="0"/>
+          <a:chOff x="0" y="0"/>
+          <a:chExt cx="0" cy="0"/>
+        </a:xfrm>
+      </p:grpSpPr>
+      <p:sp>
+        <p:nvSpPr>
           <p:cNvPr id="3" name="TextBox 2">
             <a:extLst>
               <a:ext uri="{FF2B5EF4-FFF2-40B4-BE49-F238E27FC236}">
@@ -10409,7 +10599,7 @@
 </p:sld>
 </file>
 
-<file path=ppt/slides/slide11.xml><?xml version="1.0" encoding="utf-8"?>
+<file path=ppt/slides/slide12.xml><?xml version="1.0" encoding="utf-8"?>
 <p:sld xmlns:a="http://schemas.openxmlformats.org/drawingml/2006/main" xmlns:r="http://schemas.openxmlformats.org/officeDocument/2006/relationships" xmlns:p="http://schemas.openxmlformats.org/presentationml/2006/main">
   <p:cSld>
     <p:spTree>
@@ -10476,7 +10666,7 @@
 </p:sld>
 </file>
 
-<file path=ppt/slides/slide12.xml><?xml version="1.0" encoding="utf-8"?>
+<file path=ppt/slides/slide13.xml><?xml version="1.0" encoding="utf-8"?>
 <p:sld xmlns:a="http://schemas.openxmlformats.org/drawingml/2006/main" xmlns:r="http://schemas.openxmlformats.org/officeDocument/2006/relationships" xmlns:p="http://schemas.openxmlformats.org/presentationml/2006/main">
   <p:cSld>
     <p:spTree>
@@ -10647,7 +10837,7 @@
 </p:sld>
 </file>
 
-<file path=ppt/slides/slide13.xml><?xml version="1.0" encoding="utf-8"?>
+<file path=ppt/slides/slide14.xml><?xml version="1.0" encoding="utf-8"?>
 <p:sld xmlns:a="http://schemas.openxmlformats.org/drawingml/2006/main" xmlns:r="http://schemas.openxmlformats.org/officeDocument/2006/relationships" xmlns:p="http://schemas.openxmlformats.org/presentationml/2006/main">
   <p:cSld>
     <p:spTree>
@@ -10816,7 +11006,7 @@
 </p:sld>
 </file>
 
-<file path=ppt/slides/slide14.xml><?xml version="1.0" encoding="utf-8"?>
+<file path=ppt/slides/slide15.xml><?xml version="1.0" encoding="utf-8"?>
 <p:sld xmlns:a="http://schemas.openxmlformats.org/drawingml/2006/main" xmlns:r="http://schemas.openxmlformats.org/officeDocument/2006/relationships" xmlns:p="http://schemas.openxmlformats.org/presentationml/2006/main">
   <p:cSld>
     <p:spTree>
@@ -10985,7 +11175,7 @@
 </p:sld>
 </file>
 
-<file path=ppt/slides/slide15.xml><?xml version="1.0" encoding="utf-8"?>
+<file path=ppt/slides/slide16.xml><?xml version="1.0" encoding="utf-8"?>
 <p:sld xmlns:a="http://schemas.openxmlformats.org/drawingml/2006/main" xmlns:r="http://schemas.openxmlformats.org/officeDocument/2006/relationships" xmlns:p="http://schemas.openxmlformats.org/presentationml/2006/main">
   <p:cSld>
     <p:spTree>
@@ -11231,7 +11421,7 @@
 </p:sld>
 </file>
 
-<file path=ppt/slides/slide16.xml><?xml version="1.0" encoding="utf-8"?>
+<file path=ppt/slides/slide17.xml><?xml version="1.0" encoding="utf-8"?>
 <p:sld xmlns:a="http://schemas.openxmlformats.org/drawingml/2006/main" xmlns:r="http://schemas.openxmlformats.org/officeDocument/2006/relationships" xmlns:p="http://schemas.openxmlformats.org/presentationml/2006/main">
   <p:cSld>
     <p:spTree>
@@ -11329,7 +11519,7 @@
 </p:sld>
 </file>
 
-<file path=ppt/slides/slide17.xml><?xml version="1.0" encoding="utf-8"?>
+<file path=ppt/slides/slide18.xml><?xml version="1.0" encoding="utf-8"?>
 <p:sld xmlns:a="http://schemas.openxmlformats.org/drawingml/2006/main" xmlns:r="http://schemas.openxmlformats.org/officeDocument/2006/relationships" xmlns:p="http://schemas.openxmlformats.org/presentationml/2006/main">
   <p:cSld>
     <p:spTree>
@@ -11516,7 +11706,7 @@
 </p:sld>
 </file>
 
-<file path=ppt/slides/slide18.xml><?xml version="1.0" encoding="utf-8"?>
+<file path=ppt/slides/slide19.xml><?xml version="1.0" encoding="utf-8"?>
 <p:sld xmlns:a="http://schemas.openxmlformats.org/drawingml/2006/main" xmlns:r="http://schemas.openxmlformats.org/officeDocument/2006/relationships" xmlns:p="http://schemas.openxmlformats.org/presentationml/2006/main">
   <p:cSld>
     <p:spTree>
@@ -11662,73 +11852,6 @@
               <a:t>&lt;div&gt; is the most generic HTML element, while very useful, make sure something else isn’t more appropriate.</a:t>
             </a:r>
             <a:endParaRPr sz="1600"/>
-          </a:p>
-        </p:txBody>
-      </p:sp>
-    </p:spTree>
-  </p:cSld>
-  <p:clrMapOvr>
-    <a:masterClrMapping/>
-  </p:clrMapOvr>
-</p:sld>
-</file>
-
-<file path=ppt/slides/slide19.xml><?xml version="1.0" encoding="utf-8"?>
-<p:sld xmlns:a="http://schemas.openxmlformats.org/drawingml/2006/main" xmlns:r="http://schemas.openxmlformats.org/officeDocument/2006/relationships" xmlns:p="http://schemas.openxmlformats.org/presentationml/2006/main">
-  <p:cSld>
-    <p:spTree>
-      <p:nvGrpSpPr>
-        <p:cNvPr id="1" name="Shape 208"/>
-        <p:cNvGrpSpPr/>
-        <p:nvPr/>
-      </p:nvGrpSpPr>
-      <p:grpSpPr>
-        <a:xfrm>
-          <a:off x="0" y="0"/>
-          <a:ext cx="0" cy="0"/>
-          <a:chOff x="0" y="0"/>
-          <a:chExt cx="0" cy="0"/>
-        </a:xfrm>
-      </p:grpSpPr>
-      <p:sp>
-        <p:nvSpPr>
-          <p:cNvPr id="209" name="Google Shape;209;p33"/>
-          <p:cNvSpPr txBox="1">
-            <a:spLocks noGrp="1"/>
-          </p:cNvSpPr>
-          <p:nvPr>
-            <p:ph type="title"/>
-          </p:nvPr>
-        </p:nvSpPr>
-        <p:spPr>
-          <a:xfrm>
-            <a:off x="406425" y="1806825"/>
-            <a:ext cx="8296800" cy="1542000"/>
-          </a:xfrm>
-          <a:prstGeom prst="rect">
-            <a:avLst/>
-          </a:prstGeom>
-        </p:spPr>
-        <p:txBody>
-          <a:bodyPr spcFirstLastPara="1" wrap="square" lIns="91425" tIns="91425" rIns="91425" bIns="91425" anchor="ctr" anchorCtr="0">
-            <a:noAutofit/>
-          </a:bodyPr>
-          <a:lstStyle/>
-          <a:p>
-            <a:pPr marL="0" lvl="0" indent="0" algn="ctr" rtl="0">
-              <a:spcBef>
-                <a:spcPts val="0"/>
-              </a:spcBef>
-              <a:spcAft>
-                <a:spcPts val="0"/>
-              </a:spcAft>
-              <a:buNone/>
-            </a:pPr>
-            <a:r>
-              <a:rPr lang="en" dirty="0"/>
-              <a:t>Semantic HTML is good SEO</a:t>
-            </a:r>
-            <a:endParaRPr dirty="0"/>
           </a:p>
         </p:txBody>
       </p:sp>
@@ -11800,10 +11923,10 @@
               <a:buNone/>
             </a:pPr>
             <a:r>
-              <a:rPr lang="en"/>
-              <a:t>Tiny Tips</a:t>
-            </a:r>
-            <a:endParaRPr>
+              <a:rPr lang="en" dirty="0"/>
+              <a:t>A11y Tips</a:t>
+            </a:r>
+            <a:endParaRPr dirty="0">
               <a:solidFill>
                 <a:srgbClr val="434343"/>
               </a:solidFill>
@@ -11950,7 +12073,7 @@
             <a:endParaRPr sz="1500" dirty="0"/>
           </a:p>
           <a:p>
-            <a:pPr marL="457200" lvl="0" indent="-323850" algn="l" rtl="0">
+            <a:pPr marL="133350" lvl="0" indent="0" algn="l" rtl="0">
               <a:lnSpc>
                 <a:spcPct val="150000"/>
               </a:lnSpc>
@@ -11961,12 +12084,8 @@
                 <a:spcPts val="0"/>
               </a:spcAft>
               <a:buSzPts val="1500"/>
-              <a:buChar char="-"/>
+              <a:buNone/>
             </a:pPr>
-            <a:r>
-              <a:rPr lang="en" sz="1500" dirty="0"/>
-              <a:t>Helper classes</a:t>
-            </a:r>
             <a:endParaRPr sz="1500" dirty="0"/>
           </a:p>
         </p:txBody>
@@ -11980,6 +12099,73 @@
 </file>
 
 <file path=ppt/slides/slide20.xml><?xml version="1.0" encoding="utf-8"?>
+<p:sld xmlns:a="http://schemas.openxmlformats.org/drawingml/2006/main" xmlns:r="http://schemas.openxmlformats.org/officeDocument/2006/relationships" xmlns:p="http://schemas.openxmlformats.org/presentationml/2006/main">
+  <p:cSld>
+    <p:spTree>
+      <p:nvGrpSpPr>
+        <p:cNvPr id="1" name="Shape 208"/>
+        <p:cNvGrpSpPr/>
+        <p:nvPr/>
+      </p:nvGrpSpPr>
+      <p:grpSpPr>
+        <a:xfrm>
+          <a:off x="0" y="0"/>
+          <a:ext cx="0" cy="0"/>
+          <a:chOff x="0" y="0"/>
+          <a:chExt cx="0" cy="0"/>
+        </a:xfrm>
+      </p:grpSpPr>
+      <p:sp>
+        <p:nvSpPr>
+          <p:cNvPr id="209" name="Google Shape;209;p33"/>
+          <p:cNvSpPr txBox="1">
+            <a:spLocks noGrp="1"/>
+          </p:cNvSpPr>
+          <p:nvPr>
+            <p:ph type="title"/>
+          </p:nvPr>
+        </p:nvSpPr>
+        <p:spPr>
+          <a:xfrm>
+            <a:off x="406425" y="1806825"/>
+            <a:ext cx="8296800" cy="1542000"/>
+          </a:xfrm>
+          <a:prstGeom prst="rect">
+            <a:avLst/>
+          </a:prstGeom>
+        </p:spPr>
+        <p:txBody>
+          <a:bodyPr spcFirstLastPara="1" wrap="square" lIns="91425" tIns="91425" rIns="91425" bIns="91425" anchor="ctr" anchorCtr="0">
+            <a:noAutofit/>
+          </a:bodyPr>
+          <a:lstStyle/>
+          <a:p>
+            <a:pPr marL="0" lvl="0" indent="0" algn="ctr" rtl="0">
+              <a:spcBef>
+                <a:spcPts val="0"/>
+              </a:spcBef>
+              <a:spcAft>
+                <a:spcPts val="0"/>
+              </a:spcAft>
+              <a:buNone/>
+            </a:pPr>
+            <a:r>
+              <a:rPr lang="en" dirty="0"/>
+              <a:t>Semantic HTML is good SEO</a:t>
+            </a:r>
+            <a:endParaRPr dirty="0"/>
+          </a:p>
+        </p:txBody>
+      </p:sp>
+    </p:spTree>
+  </p:cSld>
+  <p:clrMapOvr>
+    <a:masterClrMapping/>
+  </p:clrMapOvr>
+</p:sld>
+</file>
+
+<file path=ppt/slides/slide21.xml><?xml version="1.0" encoding="utf-8"?>
 <p:sld xmlns:a="http://schemas.openxmlformats.org/drawingml/2006/main" xmlns:r="http://schemas.openxmlformats.org/officeDocument/2006/relationships" xmlns:p="http://schemas.openxmlformats.org/presentationml/2006/main">
   <p:cSld>
     <p:spTree>
@@ -12154,7 +12340,7 @@
 </p:sld>
 </file>
 
-<file path=ppt/slides/slide21.xml><?xml version="1.0" encoding="utf-8"?>
+<file path=ppt/slides/slide22.xml><?xml version="1.0" encoding="utf-8"?>
 <p:sld xmlns:a="http://schemas.openxmlformats.org/drawingml/2006/main" xmlns:r="http://schemas.openxmlformats.org/officeDocument/2006/relationships" xmlns:p="http://schemas.openxmlformats.org/presentationml/2006/main">
   <p:cSld>
     <p:spTree>
@@ -12221,7 +12407,7 @@
 </p:sld>
 </file>
 
-<file path=ppt/slides/slide22.xml><?xml version="1.0" encoding="utf-8"?>
+<file path=ppt/slides/slide23.xml><?xml version="1.0" encoding="utf-8"?>
 <p:sld xmlns:a="http://schemas.openxmlformats.org/drawingml/2006/main" xmlns:r="http://schemas.openxmlformats.org/officeDocument/2006/relationships" xmlns:p="http://schemas.openxmlformats.org/presentationml/2006/main">
   <p:cSld>
     <p:spTree>
@@ -12390,7 +12576,7 @@
 </p:sld>
 </file>
 
-<file path=ppt/slides/slide23.xml><?xml version="1.0" encoding="utf-8"?>
+<file path=ppt/slides/slide24.xml><?xml version="1.0" encoding="utf-8"?>
 <p:sld xmlns:a="http://schemas.openxmlformats.org/drawingml/2006/main" xmlns:r="http://schemas.openxmlformats.org/officeDocument/2006/relationships" xmlns:p="http://schemas.openxmlformats.org/presentationml/2006/main">
   <p:cSld>
     <p:spTree>
@@ -12565,7 +12751,7 @@
 </p:sld>
 </file>
 
-<file path=ppt/slides/slide24.xml><?xml version="1.0" encoding="utf-8"?>
+<file path=ppt/slides/slide25.xml><?xml version="1.0" encoding="utf-8"?>
 <p:sld xmlns:a="http://schemas.openxmlformats.org/drawingml/2006/main" xmlns:r="http://schemas.openxmlformats.org/officeDocument/2006/relationships" xmlns:p="http://schemas.openxmlformats.org/presentationml/2006/main">
   <p:cSld>
     <p:spTree>
@@ -12730,7 +12916,7 @@
 </p:sld>
 </file>
 
-<file path=ppt/slides/slide25.xml><?xml version="1.0" encoding="utf-8"?>
+<file path=ppt/slides/slide26.xml><?xml version="1.0" encoding="utf-8"?>
 <p:sld xmlns:a="http://schemas.openxmlformats.org/drawingml/2006/main" xmlns:r="http://schemas.openxmlformats.org/officeDocument/2006/relationships" xmlns:p="http://schemas.openxmlformats.org/presentationml/2006/main">
   <p:cSld>
     <p:spTree>
@@ -12885,7 +13071,7 @@
 </p:sld>
 </file>
 
-<file path=ppt/slides/slide26.xml><?xml version="1.0" encoding="utf-8"?>
+<file path=ppt/slides/slide27.xml><?xml version="1.0" encoding="utf-8"?>
 <p:sld xmlns:a="http://schemas.openxmlformats.org/drawingml/2006/main" xmlns:r="http://schemas.openxmlformats.org/officeDocument/2006/relationships" xmlns:p="http://schemas.openxmlformats.org/presentationml/2006/main">
   <p:cSld>
     <p:spTree>
@@ -13050,7 +13236,7 @@
 </p:sld>
 </file>
 
-<file path=ppt/slides/slide27.xml><?xml version="1.0" encoding="utf-8"?>
+<file path=ppt/slides/slide28.xml><?xml version="1.0" encoding="utf-8"?>
 <p:sld xmlns:a="http://schemas.openxmlformats.org/drawingml/2006/main" xmlns:r="http://schemas.openxmlformats.org/officeDocument/2006/relationships" xmlns:p="http://schemas.openxmlformats.org/presentationml/2006/main">
   <p:cSld>
     <p:spTree>
@@ -13117,7 +13303,7 @@
 </p:sld>
 </file>
 
-<file path=ppt/slides/slide28.xml><?xml version="1.0" encoding="utf-8"?>
+<file path=ppt/slides/slide29.xml><?xml version="1.0" encoding="utf-8"?>
 <p:sld xmlns:a="http://schemas.openxmlformats.org/drawingml/2006/main" xmlns:r="http://schemas.openxmlformats.org/officeDocument/2006/relationships" xmlns:p="http://schemas.openxmlformats.org/presentationml/2006/main">
   <p:cSld>
     <p:spTree>
@@ -13385,185 +13571,6 @@
           </a:ln>
         </p:spPr>
       </p:pic>
-    </p:spTree>
-  </p:cSld>
-  <p:clrMapOvr>
-    <a:masterClrMapping/>
-  </p:clrMapOvr>
-</p:sld>
-</file>
-
-<file path=ppt/slides/slide29.xml><?xml version="1.0" encoding="utf-8"?>
-<p:sld xmlns:a="http://schemas.openxmlformats.org/drawingml/2006/main" xmlns:r="http://schemas.openxmlformats.org/officeDocument/2006/relationships" xmlns:p="http://schemas.openxmlformats.org/presentationml/2006/main">
-  <p:cSld>
-    <p:spTree>
-      <p:nvGrpSpPr>
-        <p:cNvPr id="1" name="Shape 348"/>
-        <p:cNvGrpSpPr/>
-        <p:nvPr/>
-      </p:nvGrpSpPr>
-      <p:grpSpPr>
-        <a:xfrm>
-          <a:off x="0" y="0"/>
-          <a:ext cx="0" cy="0"/>
-          <a:chOff x="0" y="0"/>
-          <a:chExt cx="0" cy="0"/>
-        </a:xfrm>
-      </p:grpSpPr>
-      <p:sp>
-        <p:nvSpPr>
-          <p:cNvPr id="349" name="Google Shape;349;p52"/>
-          <p:cNvSpPr txBox="1">
-            <a:spLocks noGrp="1"/>
-          </p:cNvSpPr>
-          <p:nvPr>
-            <p:ph type="title"/>
-          </p:nvPr>
-        </p:nvSpPr>
-        <p:spPr>
-          <a:xfrm>
-            <a:off x="608500" y="575950"/>
-            <a:ext cx="8113500" cy="635400"/>
-          </a:xfrm>
-          <a:prstGeom prst="rect">
-            <a:avLst/>
-          </a:prstGeom>
-        </p:spPr>
-        <p:txBody>
-          <a:bodyPr spcFirstLastPara="1" wrap="square" lIns="91425" tIns="91425" rIns="91425" bIns="91425" anchor="t" anchorCtr="0">
-            <a:noAutofit/>
-          </a:bodyPr>
-          <a:lstStyle/>
-          <a:p>
-            <a:pPr marL="0" lvl="0" indent="0" algn="l" rtl="0">
-              <a:spcBef>
-                <a:spcPts val="0"/>
-              </a:spcBef>
-              <a:spcAft>
-                <a:spcPts val="0"/>
-              </a:spcAft>
-              <a:buNone/>
-            </a:pPr>
-            <a:r>
-              <a:rPr lang="en"/>
-              <a:t>Checkboxes &amp; Radios</a:t>
-            </a:r>
-            <a:endParaRPr/>
-          </a:p>
-        </p:txBody>
-      </p:sp>
-      <p:sp>
-        <p:nvSpPr>
-          <p:cNvPr id="351" name="Google Shape;351;p52"/>
-          <p:cNvSpPr txBox="1">
-            <a:spLocks noGrp="1"/>
-          </p:cNvSpPr>
-          <p:nvPr>
-            <p:ph type="body" idx="1"/>
-          </p:nvPr>
-        </p:nvSpPr>
-        <p:spPr>
-          <a:xfrm>
-            <a:off x="603697" y="1566925"/>
-            <a:ext cx="8123100" cy="3002400"/>
-          </a:xfrm>
-          <a:prstGeom prst="rect">
-            <a:avLst/>
-          </a:prstGeom>
-        </p:spPr>
-        <p:txBody>
-          <a:bodyPr spcFirstLastPara="1" wrap="square" lIns="91425" tIns="91425" rIns="91425" bIns="91425" anchor="t" anchorCtr="0">
-            <a:noAutofit/>
-          </a:bodyPr>
-          <a:lstStyle/>
-          <a:p>
-            <a:pPr marL="0" lvl="0" indent="0" algn="l" rtl="0">
-              <a:spcBef>
-                <a:spcPts val="0"/>
-              </a:spcBef>
-              <a:spcAft>
-                <a:spcPts val="0"/>
-              </a:spcAft>
-              <a:buNone/>
-            </a:pPr>
-            <a:r>
-              <a:rPr lang="en" sz="1600" dirty="0"/>
-              <a:t>Set the size of checkboxes &amp; radios.</a:t>
-            </a:r>
-            <a:endParaRPr sz="1600" dirty="0"/>
-          </a:p>
-          <a:p>
-            <a:pPr marL="0" lvl="0" indent="0" algn="l" rtl="0">
-              <a:spcBef>
-                <a:spcPts val="1200"/>
-              </a:spcBef>
-              <a:spcAft>
-                <a:spcPts val="0"/>
-              </a:spcAft>
-              <a:buNone/>
-            </a:pPr>
-            <a:r>
-              <a:rPr lang="en" sz="1600" dirty="0"/>
-              <a:t>input[type=checkbox],</a:t>
-            </a:r>
-            <a:br>
-              <a:rPr lang="en" sz="1600" dirty="0"/>
-            </a:br>
-            <a:r>
-              <a:rPr lang="en" sz="1600" dirty="0"/>
-              <a:t>input[type=radio] {</a:t>
-            </a:r>
-            <a:br>
-              <a:rPr lang="en" sz="1600" dirty="0"/>
-            </a:br>
-            <a:r>
-              <a:rPr lang="en" sz="1600" dirty="0"/>
-              <a:t>	min-width: 24px;</a:t>
-            </a:r>
-            <a:br>
-              <a:rPr lang="en" sz="1600" dirty="0"/>
-            </a:br>
-            <a:r>
-              <a:rPr lang="en" sz="1600" dirty="0"/>
-              <a:t>	min-height: 24px;</a:t>
-            </a:r>
-            <a:br>
-              <a:rPr lang="en" sz="1600" dirty="0"/>
-            </a:br>
-            <a:r>
-              <a:rPr lang="en" sz="1600" dirty="0"/>
-              <a:t>	width: 1.5rem;</a:t>
-            </a:r>
-            <a:br>
-              <a:rPr lang="en" sz="1600" dirty="0"/>
-            </a:br>
-            <a:r>
-              <a:rPr lang="en" sz="1600" dirty="0"/>
-              <a:t>	height: 1.5rem;</a:t>
-            </a:r>
-            <a:br>
-              <a:rPr lang="en" sz="1600" dirty="0"/>
-            </a:br>
-            <a:r>
-              <a:rPr lang="en" sz="1600" dirty="0"/>
-              <a:t>}</a:t>
-            </a:r>
-            <a:endParaRPr sz="1600" dirty="0"/>
-          </a:p>
-          <a:p>
-            <a:pPr marL="0" lvl="0" indent="0" algn="l" rtl="0">
-              <a:spcBef>
-                <a:spcPts val="1200"/>
-              </a:spcBef>
-              <a:spcAft>
-                <a:spcPts val="1200"/>
-              </a:spcAft>
-              <a:buNone/>
-            </a:pPr>
-            <a:endParaRPr sz="1600" dirty="0"/>
-          </a:p>
-        </p:txBody>
-      </p:sp>
     </p:spTree>
   </p:cSld>
   <p:clrMapOvr>
@@ -13888,6 +13895,185 @@
   <p:cSld>
     <p:spTree>
       <p:nvGrpSpPr>
+        <p:cNvPr id="1" name="Shape 348"/>
+        <p:cNvGrpSpPr/>
+        <p:nvPr/>
+      </p:nvGrpSpPr>
+      <p:grpSpPr>
+        <a:xfrm>
+          <a:off x="0" y="0"/>
+          <a:ext cx="0" cy="0"/>
+          <a:chOff x="0" y="0"/>
+          <a:chExt cx="0" cy="0"/>
+        </a:xfrm>
+      </p:grpSpPr>
+      <p:sp>
+        <p:nvSpPr>
+          <p:cNvPr id="349" name="Google Shape;349;p52"/>
+          <p:cNvSpPr txBox="1">
+            <a:spLocks noGrp="1"/>
+          </p:cNvSpPr>
+          <p:nvPr>
+            <p:ph type="title"/>
+          </p:nvPr>
+        </p:nvSpPr>
+        <p:spPr>
+          <a:xfrm>
+            <a:off x="608500" y="575950"/>
+            <a:ext cx="8113500" cy="635400"/>
+          </a:xfrm>
+          <a:prstGeom prst="rect">
+            <a:avLst/>
+          </a:prstGeom>
+        </p:spPr>
+        <p:txBody>
+          <a:bodyPr spcFirstLastPara="1" wrap="square" lIns="91425" tIns="91425" rIns="91425" bIns="91425" anchor="t" anchorCtr="0">
+            <a:noAutofit/>
+          </a:bodyPr>
+          <a:lstStyle/>
+          <a:p>
+            <a:pPr marL="0" lvl="0" indent="0" algn="l" rtl="0">
+              <a:spcBef>
+                <a:spcPts val="0"/>
+              </a:spcBef>
+              <a:spcAft>
+                <a:spcPts val="0"/>
+              </a:spcAft>
+              <a:buNone/>
+            </a:pPr>
+            <a:r>
+              <a:rPr lang="en"/>
+              <a:t>Checkboxes &amp; Radios</a:t>
+            </a:r>
+            <a:endParaRPr/>
+          </a:p>
+        </p:txBody>
+      </p:sp>
+      <p:sp>
+        <p:nvSpPr>
+          <p:cNvPr id="351" name="Google Shape;351;p52"/>
+          <p:cNvSpPr txBox="1">
+            <a:spLocks noGrp="1"/>
+          </p:cNvSpPr>
+          <p:nvPr>
+            <p:ph type="body" idx="1"/>
+          </p:nvPr>
+        </p:nvSpPr>
+        <p:spPr>
+          <a:xfrm>
+            <a:off x="603697" y="1566925"/>
+            <a:ext cx="8123100" cy="3002400"/>
+          </a:xfrm>
+          <a:prstGeom prst="rect">
+            <a:avLst/>
+          </a:prstGeom>
+        </p:spPr>
+        <p:txBody>
+          <a:bodyPr spcFirstLastPara="1" wrap="square" lIns="91425" tIns="91425" rIns="91425" bIns="91425" anchor="t" anchorCtr="0">
+            <a:noAutofit/>
+          </a:bodyPr>
+          <a:lstStyle/>
+          <a:p>
+            <a:pPr marL="0" lvl="0" indent="0" algn="l" rtl="0">
+              <a:spcBef>
+                <a:spcPts val="0"/>
+              </a:spcBef>
+              <a:spcAft>
+                <a:spcPts val="0"/>
+              </a:spcAft>
+              <a:buNone/>
+            </a:pPr>
+            <a:r>
+              <a:rPr lang="en" sz="1600" dirty="0"/>
+              <a:t>Set the size of checkboxes &amp; radios.</a:t>
+            </a:r>
+            <a:endParaRPr sz="1600" dirty="0"/>
+          </a:p>
+          <a:p>
+            <a:pPr marL="0" lvl="0" indent="0" algn="l" rtl="0">
+              <a:spcBef>
+                <a:spcPts val="1200"/>
+              </a:spcBef>
+              <a:spcAft>
+                <a:spcPts val="0"/>
+              </a:spcAft>
+              <a:buNone/>
+            </a:pPr>
+            <a:r>
+              <a:rPr lang="en" sz="1600" dirty="0"/>
+              <a:t>input[type=checkbox],</a:t>
+            </a:r>
+            <a:br>
+              <a:rPr lang="en" sz="1600" dirty="0"/>
+            </a:br>
+            <a:r>
+              <a:rPr lang="en" sz="1600" dirty="0"/>
+              <a:t>input[type=radio] {</a:t>
+            </a:r>
+            <a:br>
+              <a:rPr lang="en" sz="1600" dirty="0"/>
+            </a:br>
+            <a:r>
+              <a:rPr lang="en" sz="1600" dirty="0"/>
+              <a:t>	min-width: 24px;</a:t>
+            </a:r>
+            <a:br>
+              <a:rPr lang="en" sz="1600" dirty="0"/>
+            </a:br>
+            <a:r>
+              <a:rPr lang="en" sz="1600" dirty="0"/>
+              <a:t>	min-height: 24px;</a:t>
+            </a:r>
+            <a:br>
+              <a:rPr lang="en" sz="1600" dirty="0"/>
+            </a:br>
+            <a:r>
+              <a:rPr lang="en" sz="1600" dirty="0"/>
+              <a:t>	width: 1.5rem;</a:t>
+            </a:r>
+            <a:br>
+              <a:rPr lang="en" sz="1600" dirty="0"/>
+            </a:br>
+            <a:r>
+              <a:rPr lang="en" sz="1600" dirty="0"/>
+              <a:t>	height: 1.5rem;</a:t>
+            </a:r>
+            <a:br>
+              <a:rPr lang="en" sz="1600" dirty="0"/>
+            </a:br>
+            <a:r>
+              <a:rPr lang="en" sz="1600" dirty="0"/>
+              <a:t>}</a:t>
+            </a:r>
+            <a:endParaRPr sz="1600" dirty="0"/>
+          </a:p>
+          <a:p>
+            <a:pPr marL="0" lvl="0" indent="0" algn="l" rtl="0">
+              <a:spcBef>
+                <a:spcPts val="1200"/>
+              </a:spcBef>
+              <a:spcAft>
+                <a:spcPts val="1200"/>
+              </a:spcAft>
+              <a:buNone/>
+            </a:pPr>
+            <a:endParaRPr sz="1600" dirty="0"/>
+          </a:p>
+        </p:txBody>
+      </p:sp>
+    </p:spTree>
+  </p:cSld>
+  <p:clrMapOvr>
+    <a:masterClrMapping/>
+  </p:clrMapOvr>
+</p:sld>
+</file>
+
+<file path=ppt/slides/slide31.xml><?xml version="1.0" encoding="utf-8"?>
+<p:sld xmlns:a="http://schemas.openxmlformats.org/drawingml/2006/main" xmlns:r="http://schemas.openxmlformats.org/officeDocument/2006/relationships" xmlns:p="http://schemas.openxmlformats.org/presentationml/2006/main">
+  <p:cSld>
+    <p:spTree>
+      <p:nvGrpSpPr>
         <p:cNvPr id="1" name="Shape 355"/>
         <p:cNvGrpSpPr/>
         <p:nvPr/>
@@ -14040,7 +14226,7 @@
 </p:sld>
 </file>
 
-<file path=ppt/slides/slide31.xml><?xml version="1.0" encoding="utf-8"?>
+<file path=ppt/slides/slide32.xml><?xml version="1.0" encoding="utf-8"?>
 <p:sld xmlns:a="http://schemas.openxmlformats.org/drawingml/2006/main" xmlns:r="http://schemas.openxmlformats.org/officeDocument/2006/relationships" xmlns:p="http://schemas.openxmlformats.org/presentationml/2006/main">
   <p:cSld>
     <p:spTree>
@@ -14346,7 +14532,7 @@
 </p:sld>
 </file>
 
-<file path=ppt/slides/slide32.xml><?xml version="1.0" encoding="utf-8"?>
+<file path=ppt/slides/slide33.xml><?xml version="1.0" encoding="utf-8"?>
 <p:sld xmlns:a="http://schemas.openxmlformats.org/drawingml/2006/main" xmlns:r="http://schemas.openxmlformats.org/officeDocument/2006/relationships" xmlns:p="http://schemas.openxmlformats.org/presentationml/2006/main">
   <p:cSld>
     <p:spTree>
@@ -14579,7 +14765,7 @@
 </p:sld>
 </file>
 
-<file path=ppt/slides/slide33.xml><?xml version="1.0" encoding="utf-8"?>
+<file path=ppt/slides/slide34.xml><?xml version="1.0" encoding="utf-8"?>
 <p:sld xmlns:a="http://schemas.openxmlformats.org/drawingml/2006/main" xmlns:r="http://schemas.openxmlformats.org/officeDocument/2006/relationships" xmlns:p="http://schemas.openxmlformats.org/presentationml/2006/main">
   <p:cSld>
     <p:spTree>
@@ -14784,7 +14970,7 @@
 </p:sld>
 </file>
 
-<file path=ppt/slides/slide34.xml><?xml version="1.0" encoding="utf-8"?>
+<file path=ppt/slides/slide35.xml><?xml version="1.0" encoding="utf-8"?>
 <p:sld xmlns:a="http://schemas.openxmlformats.org/drawingml/2006/main" xmlns:r="http://schemas.openxmlformats.org/officeDocument/2006/relationships" xmlns:p="http://schemas.openxmlformats.org/presentationml/2006/main">
   <p:cSld>
     <p:spTree>
@@ -14861,7 +15047,7 @@
 </p:sld>
 </file>
 
-<file path=ppt/slides/slide35.xml><?xml version="1.0" encoding="utf-8"?>
+<file path=ppt/slides/slide36.xml><?xml version="1.0" encoding="utf-8"?>
 <p:sld xmlns:a="http://schemas.openxmlformats.org/drawingml/2006/main" xmlns:r="http://schemas.openxmlformats.org/officeDocument/2006/relationships" xmlns:p="http://schemas.openxmlformats.org/presentationml/2006/main">
   <p:cSld>
     <p:spTree>
@@ -15073,7 +15259,13 @@
       </p:grpSpPr>
       <p:sp>
         <p:nvSpPr>
-          <p:cNvPr id="2" name="Title 1"/>
+          <p:cNvPr id="2" name="Title 1">
+            <a:extLst>
+              <a:ext uri="{FF2B5EF4-FFF2-40B4-BE49-F238E27FC236}">
+                <a16:creationId xmlns:a16="http://schemas.microsoft.com/office/drawing/2014/main" id="{C7B4704E-3049-8FB5-521A-FF75C690786E}"/>
+              </a:ext>
+            </a:extLst>
+          </p:cNvPr>
           <p:cNvSpPr>
             <a:spLocks noGrp="1"/>
           </p:cNvSpPr>
@@ -15081,70 +15273,82 @@
             <p:ph type="title"/>
           </p:nvPr>
         </p:nvSpPr>
-        <p:spPr>
-          <a:xfrm>
-            <a:off x="818338" y="301630"/>
-            <a:ext cx="6321600" cy="635400"/>
-          </a:xfrm>
-        </p:spPr>
+        <p:spPr/>
         <p:txBody>
           <a:bodyPr/>
           <a:lstStyle/>
           <a:p>
             <a:r>
-              <a:rPr dirty="0">
-                <a:solidFill>
-                  <a:schemeClr val="accent1"/>
-                </a:solidFill>
-              </a:rPr>
-              <a:t>Introduction to ARIA</a:t>
+              <a:rPr lang="en-DK" dirty="0"/>
+              <a:t>ARIA and screen reader</a:t>
             </a:r>
           </a:p>
         </p:txBody>
       </p:sp>
       <p:sp>
         <p:nvSpPr>
-          <p:cNvPr id="3" name="Content Placeholder 2"/>
-          <p:cNvSpPr>
-            <a:spLocks noGrp="1"/>
-          </p:cNvSpPr>
-          <p:nvPr>
-            <p:ph idx="1"/>
-          </p:nvPr>
+          <p:cNvPr id="3" name="TextBox 2">
+            <a:extLst>
+              <a:ext uri="{FF2B5EF4-FFF2-40B4-BE49-F238E27FC236}">
+                <a16:creationId xmlns:a16="http://schemas.microsoft.com/office/drawing/2014/main" id="{35794B09-5EC7-6472-746E-BB7F6A903392}"/>
+              </a:ext>
+            </a:extLst>
+          </p:cNvPr>
+          <p:cNvSpPr txBox="1"/>
+          <p:nvPr/>
         </p:nvSpPr>
-        <p:spPr/>
+        <p:spPr>
+          <a:xfrm>
+            <a:off x="4554825" y="4331970"/>
+            <a:ext cx="4312399" cy="523220"/>
+          </a:xfrm>
+          <a:prstGeom prst="rect">
+            <a:avLst/>
+          </a:prstGeom>
+          <a:noFill/>
+        </p:spPr>
         <p:txBody>
-          <a:bodyPr/>
+          <a:bodyPr wrap="none" rtlCol="0">
+            <a:spAutoFit/>
+          </a:bodyPr>
           <a:lstStyle/>
           <a:p>
             <a:r>
-              <a:rPr dirty="0"/>
-              <a:t>ARIA stands for Accessible Rich Internet Applications.</a:t>
-            </a:r>
-          </a:p>
-          <a:p>
-            <a:r>
-              <a:rPr dirty="0"/>
-              <a:t>It is a set of attributes that can be added to HTML elements to convey additional information to </a:t>
-            </a:r>
-            <a:r>
-              <a:rPr dirty="0">
+              <a:rPr lang="en-GB" dirty="0">
                 <a:solidFill>
-                  <a:schemeClr val="accent1"/>
+                  <a:schemeClr val="bg1"/>
                 </a:solidFill>
+                <a:hlinkClick r:id="rId3">
+                  <a:extLst>
+                    <a:ext uri="{A12FA001-AC4F-418D-AE19-62706E023703}">
+                      <ahyp:hlinkClr xmlns:ahyp="http://schemas.microsoft.com/office/drawing/2018/hyperlinkcolor" val="tx"/>
+                    </a:ext>
+                  </a:extLst>
+                </a:hlinkClick>
               </a:rPr>
-              <a:t>assistive technologies.</a:t>
-            </a:r>
-          </a:p>
-          <a:p>
-            <a:r>
-              <a:rPr dirty="0"/>
-              <a:t>This additional information is invaluable for screen readers and other assistive technologies.</a:t>
-            </a:r>
+              <a:t>https://youtu.be/0hqhAIjE_8I?si=IxFCj4pUBUDiQfec</a:t>
+            </a:r>
+            <a:endParaRPr lang="en-GB" dirty="0">
+              <a:solidFill>
+                <a:schemeClr val="bg1"/>
+              </a:solidFill>
+            </a:endParaRPr>
+          </a:p>
+          <a:p>
+            <a:endParaRPr lang="en-DK" dirty="0">
+              <a:solidFill>
+                <a:schemeClr val="bg1"/>
+              </a:solidFill>
+            </a:endParaRPr>
           </a:p>
         </p:txBody>
       </p:sp>
     </p:spTree>
+    <p:extLst>
+      <p:ext uri="{BB962C8B-B14F-4D97-AF65-F5344CB8AC3E}">
+        <p14:creationId xmlns:p14="http://schemas.microsoft.com/office/powerpoint/2010/main" val="572031804"/>
+      </p:ext>
+    </p:extLst>
   </p:cSld>
   <p:clrMapOvr>
     <a:masterClrMapping/>
@@ -15179,13 +15383,23 @@
             <p:ph type="title"/>
           </p:nvPr>
         </p:nvSpPr>
-        <p:spPr/>
+        <p:spPr>
+          <a:xfrm>
+            <a:off x="818338" y="301630"/>
+            <a:ext cx="6321600" cy="635400"/>
+          </a:xfrm>
+        </p:spPr>
         <p:txBody>
           <a:bodyPr/>
           <a:lstStyle/>
           <a:p>
             <a:r>
-              <a:t>ARIA Roles for Document Structure</a:t>
+              <a:rPr dirty="0">
+                <a:solidFill>
+                  <a:schemeClr val="accent1"/>
+                </a:solidFill>
+              </a:rPr>
+              <a:t>Introduction to ARIA</a:t>
             </a:r>
           </a:p>
         </p:txBody>
@@ -15207,26 +15421,40 @@
           <a:p>
             <a:r>
               <a:rPr dirty="0"/>
-              <a:t>Roles define the purpose of an element.</a:t>
-            </a:r>
-          </a:p>
-          <a:p>
+              <a:t>ARIA stands for </a:t>
+            </a:r>
+            <a:r>
+              <a:rPr dirty="0">
+                <a:solidFill>
+                  <a:schemeClr val="accent1"/>
+                </a:solidFill>
+              </a:rPr>
+              <a:t>Accessible Rich Internet Applications</a:t>
+            </a:r>
             <a:r>
               <a:rPr dirty="0"/>
-              <a:t>ARIA roles provide context about an element's function.</a:t>
+              <a:t>.</a:t>
             </a:r>
           </a:p>
           <a:p>
             <a:r>
               <a:rPr dirty="0"/>
-              <a:t>ARIA roles are especially useful when dealing with non-standard or custom UI components.</a:t>
-            </a:r>
-          </a:p>
-          <a:p>
-            <a:pPr marL="114300" indent="0">
-              <a:buNone/>
-            </a:pPr>
-            <a:endParaRPr dirty="0"/>
+              <a:t>It is a set of attributes that can be added to HTML elements to convey additional information to </a:t>
+            </a:r>
+            <a:r>
+              <a:rPr dirty="0">
+                <a:solidFill>
+                  <a:schemeClr val="accent1"/>
+                </a:solidFill>
+              </a:rPr>
+              <a:t>assistive technologies.</a:t>
+            </a:r>
+          </a:p>
+          <a:p>
+            <a:r>
+              <a:rPr dirty="0"/>
+              <a:t>This additional information is invaluable for screen readers and other assistive technologies.</a:t>
+            </a:r>
           </a:p>
         </p:txBody>
       </p:sp>
@@ -15239,6 +15467,92 @@
 </file>
 
 <file path=ppt/slides/slide7.xml><?xml version="1.0" encoding="utf-8"?>
+<p:sld xmlns:a="http://schemas.openxmlformats.org/drawingml/2006/main" xmlns:r="http://schemas.openxmlformats.org/officeDocument/2006/relationships" xmlns:p="http://schemas.openxmlformats.org/presentationml/2006/main">
+  <p:cSld>
+    <p:spTree>
+      <p:nvGrpSpPr>
+        <p:cNvPr id="1" name=""/>
+        <p:cNvGrpSpPr/>
+        <p:nvPr/>
+      </p:nvGrpSpPr>
+      <p:grpSpPr>
+        <a:xfrm>
+          <a:off x="0" y="0"/>
+          <a:ext cx="0" cy="0"/>
+          <a:chOff x="0" y="0"/>
+          <a:chExt cx="0" cy="0"/>
+        </a:xfrm>
+      </p:grpSpPr>
+      <p:sp>
+        <p:nvSpPr>
+          <p:cNvPr id="2" name="Title 1"/>
+          <p:cNvSpPr>
+            <a:spLocks noGrp="1"/>
+          </p:cNvSpPr>
+          <p:nvPr>
+            <p:ph type="title"/>
+          </p:nvPr>
+        </p:nvSpPr>
+        <p:spPr/>
+        <p:txBody>
+          <a:bodyPr/>
+          <a:lstStyle/>
+          <a:p>
+            <a:r>
+              <a:t>ARIA Roles for Document Structure</a:t>
+            </a:r>
+          </a:p>
+        </p:txBody>
+      </p:sp>
+      <p:sp>
+        <p:nvSpPr>
+          <p:cNvPr id="3" name="Content Placeholder 2"/>
+          <p:cNvSpPr>
+            <a:spLocks noGrp="1"/>
+          </p:cNvSpPr>
+          <p:nvPr>
+            <p:ph idx="1"/>
+          </p:nvPr>
+        </p:nvSpPr>
+        <p:spPr/>
+        <p:txBody>
+          <a:bodyPr/>
+          <a:lstStyle/>
+          <a:p>
+            <a:r>
+              <a:rPr dirty="0"/>
+              <a:t>Roles define the purpose of an element.</a:t>
+            </a:r>
+          </a:p>
+          <a:p>
+            <a:r>
+              <a:rPr dirty="0"/>
+              <a:t>ARIA roles provide context about an element's function.</a:t>
+            </a:r>
+          </a:p>
+          <a:p>
+            <a:r>
+              <a:rPr dirty="0"/>
+              <a:t>ARIA roles are especially useful when dealing with non-standard or custom UI components.</a:t>
+            </a:r>
+          </a:p>
+          <a:p>
+            <a:pPr marL="114300" indent="0">
+              <a:buNone/>
+            </a:pPr>
+            <a:endParaRPr dirty="0"/>
+          </a:p>
+        </p:txBody>
+      </p:sp>
+    </p:spTree>
+  </p:cSld>
+  <p:clrMapOvr>
+    <a:masterClrMapping/>
+  </p:clrMapOvr>
+</p:sld>
+</file>
+
+<file path=ppt/slides/slide8.xml><?xml version="1.0" encoding="utf-8"?>
 <p:sld xmlns:a="http://schemas.openxmlformats.org/drawingml/2006/main" xmlns:r="http://schemas.openxmlformats.org/officeDocument/2006/relationships" xmlns:p="http://schemas.openxmlformats.org/presentationml/2006/main">
   <p:cSld>
     <p:spTree>
@@ -15328,7 +15642,7 @@
 </p:sld>
 </file>
 
-<file path=ppt/slides/slide8.xml><?xml version="1.0" encoding="utf-8"?>
+<file path=ppt/slides/slide9.xml><?xml version="1.0" encoding="utf-8"?>
 <p:sld xmlns:a="http://schemas.openxmlformats.org/drawingml/2006/main" xmlns:r="http://schemas.openxmlformats.org/officeDocument/2006/relationships" xmlns:p="http://schemas.openxmlformats.org/presentationml/2006/main">
   <p:cSld>
     <p:spTree>
@@ -15395,123 +15709,6 @@
         </p:txBody>
       </p:sp>
     </p:spTree>
-  </p:cSld>
-  <p:clrMapOvr>
-    <a:masterClrMapping/>
-  </p:clrMapOvr>
-</p:sld>
-</file>
-
-<file path=ppt/slides/slide9.xml><?xml version="1.0" encoding="utf-8"?>
-<p:sld xmlns:a="http://schemas.openxmlformats.org/drawingml/2006/main" xmlns:r="http://schemas.openxmlformats.org/officeDocument/2006/relationships" xmlns:p="http://schemas.openxmlformats.org/presentationml/2006/main">
-  <p:cSld>
-    <p:spTree>
-      <p:nvGrpSpPr>
-        <p:cNvPr id="1" name=""/>
-        <p:cNvGrpSpPr/>
-        <p:nvPr/>
-      </p:nvGrpSpPr>
-      <p:grpSpPr>
-        <a:xfrm>
-          <a:off x="0" y="0"/>
-          <a:ext cx="0" cy="0"/>
-          <a:chOff x="0" y="0"/>
-          <a:chExt cx="0" cy="0"/>
-        </a:xfrm>
-      </p:grpSpPr>
-      <p:sp>
-        <p:nvSpPr>
-          <p:cNvPr id="2" name="Title 1">
-            <a:extLst>
-              <a:ext uri="{FF2B5EF4-FFF2-40B4-BE49-F238E27FC236}">
-                <a16:creationId xmlns:a16="http://schemas.microsoft.com/office/drawing/2014/main" id="{9BDF57E0-B6EE-7971-0691-B763C73E444A}"/>
-              </a:ext>
-            </a:extLst>
-          </p:cNvPr>
-          <p:cNvSpPr>
-            <a:spLocks noGrp="1"/>
-          </p:cNvSpPr>
-          <p:nvPr>
-            <p:ph type="title"/>
-          </p:nvPr>
-        </p:nvSpPr>
-        <p:spPr/>
-        <p:txBody>
-          <a:bodyPr/>
-          <a:lstStyle/>
-          <a:p>
-            <a:r>
-              <a:rPr lang="en-DK" dirty="0"/>
-              <a:t>ARIA -Attribute</a:t>
-            </a:r>
-          </a:p>
-        </p:txBody>
-      </p:sp>
-      <p:pic>
-        <p:nvPicPr>
-          <p:cNvPr id="5" name="Content Placeholder 4" descr="A screen shot of a computer code&#10;&#10;AI-generated content may be incorrect.">
-            <a:extLst>
-              <a:ext uri="{FF2B5EF4-FFF2-40B4-BE49-F238E27FC236}">
-                <a16:creationId xmlns:a16="http://schemas.microsoft.com/office/drawing/2014/main" id="{DFCCBD1F-6152-4835-38D1-5BA280912D95}"/>
-              </a:ext>
-            </a:extLst>
-          </p:cNvPr>
-          <p:cNvPicPr>
-            <a:picLocks noGrp="1" noChangeAspect="1"/>
-          </p:cNvPicPr>
-          <p:nvPr>
-            <p:ph idx="1"/>
-          </p:nvPr>
-        </p:nvPicPr>
-        <p:blipFill>
-          <a:blip r:embed="rId2"/>
-          <a:stretch>
-            <a:fillRect/>
-          </a:stretch>
-        </p:blipFill>
-        <p:spPr>
-          <a:xfrm>
-            <a:off x="411960" y="1980825"/>
-            <a:ext cx="2697581" cy="1097441"/>
-          </a:xfrm>
-        </p:spPr>
-      </p:pic>
-      <p:pic>
-        <p:nvPicPr>
-          <p:cNvPr id="7" name="Picture 6" descr="A screenshot of a computer&#10;&#10;AI-generated content may be incorrect.">
-            <a:extLst>
-              <a:ext uri="{FF2B5EF4-FFF2-40B4-BE49-F238E27FC236}">
-                <a16:creationId xmlns:a16="http://schemas.microsoft.com/office/drawing/2014/main" id="{A0D30F77-7198-9E9E-2D4B-D5B77894D96F}"/>
-              </a:ext>
-            </a:extLst>
-          </p:cNvPr>
-          <p:cNvPicPr>
-            <a:picLocks noChangeAspect="1"/>
-          </p:cNvPicPr>
-          <p:nvPr/>
-        </p:nvPicPr>
-        <p:blipFill>
-          <a:blip r:embed="rId3"/>
-          <a:stretch>
-            <a:fillRect/>
-          </a:stretch>
-        </p:blipFill>
-        <p:spPr>
-          <a:xfrm>
-            <a:off x="3439699" y="1480672"/>
-            <a:ext cx="5613990" cy="2881117"/>
-          </a:xfrm>
-          <a:prstGeom prst="rect">
-            <a:avLst/>
-          </a:prstGeom>
-        </p:spPr>
-      </p:pic>
-    </p:spTree>
-    <p:extLst>
-      <p:ext uri="{BB962C8B-B14F-4D97-AF65-F5344CB8AC3E}">
-        <p14:creationId xmlns:p14="http://schemas.microsoft.com/office/powerpoint/2010/main" val="2819886570"/>
-      </p:ext>
-    </p:extLst>
   </p:cSld>
   <p:clrMapOvr>
     <a:masterClrMapping/>

</xml_diff>